<commit_message>
work on chapter-2 and chapter-4
</commit_message>
<xml_diff>
--- a/docs/public/drawings.pptx
+++ b/docs/public/drawings.pptx
@@ -5,11 +5,12 @@
     <p:sldMasterId id="2147483648" r:id="rId1"/>
   </p:sldMasterIdLst>
   <p:notesMasterIdLst>
-    <p:notesMasterId r:id="rId4"/>
+    <p:notesMasterId r:id="rId5"/>
   </p:notesMasterIdLst>
   <p:sldIdLst>
     <p:sldId id="257" r:id="rId2"/>
     <p:sldId id="258" r:id="rId3"/>
+    <p:sldId id="338" r:id="rId4"/>
   </p:sldIdLst>
   <p:sldSz cx="12192000" cy="6858000"/>
   <p:notesSz cx="6858000" cy="9144000"/>
@@ -6619,6 +6620,971 @@
 </p:sld>
 </file>
 
+<file path=ppt/slides/slide3.xml><?xml version="1.0" encoding="utf-8"?>
+<p:sld xmlns:a="http://schemas.openxmlformats.org/drawingml/2006/main" xmlns:r="http://schemas.openxmlformats.org/officeDocument/2006/relationships" xmlns:p="http://schemas.openxmlformats.org/presentationml/2006/main">
+  <p:cSld>
+    <p:spTree>
+      <p:nvGrpSpPr>
+        <p:cNvPr id="1" name=""/>
+        <p:cNvGrpSpPr/>
+        <p:nvPr/>
+      </p:nvGrpSpPr>
+      <p:grpSpPr>
+        <a:xfrm>
+          <a:off x="0" y="0"/>
+          <a:ext cx="0" cy="0"/>
+          <a:chOff x="0" y="0"/>
+          <a:chExt cx="0" cy="0"/>
+        </a:xfrm>
+      </p:grpSpPr>
+      <p:grpSp>
+        <p:nvGrpSpPr>
+          <p:cNvPr id="19" name="Group 18">
+            <a:extLst>
+              <a:ext uri="{FF2B5EF4-FFF2-40B4-BE49-F238E27FC236}">
+                <a16:creationId xmlns:a16="http://schemas.microsoft.com/office/drawing/2014/main" id="{9ADE262E-959D-9783-FA41-10BC9B1D484A}"/>
+              </a:ext>
+            </a:extLst>
+          </p:cNvPr>
+          <p:cNvGrpSpPr/>
+          <p:nvPr/>
+        </p:nvGrpSpPr>
+        <p:grpSpPr>
+          <a:xfrm>
+            <a:off x="2418493" y="2154342"/>
+            <a:ext cx="5991078" cy="3650922"/>
+            <a:chOff x="2418493" y="2154342"/>
+            <a:chExt cx="5991078" cy="3650922"/>
+          </a:xfrm>
+        </p:grpSpPr>
+        <p:grpSp>
+          <p:nvGrpSpPr>
+            <p:cNvPr id="9" name="Group 8">
+              <a:extLst>
+                <a:ext uri="{FF2B5EF4-FFF2-40B4-BE49-F238E27FC236}">
+                  <a16:creationId xmlns:a16="http://schemas.microsoft.com/office/drawing/2014/main" id="{F55556D6-4C52-06C4-1B0E-D6D8E8907C35}"/>
+                </a:ext>
+              </a:extLst>
+            </p:cNvPr>
+            <p:cNvGrpSpPr/>
+            <p:nvPr/>
+          </p:nvGrpSpPr>
+          <p:grpSpPr>
+            <a:xfrm>
+              <a:off x="2418493" y="2154342"/>
+              <a:ext cx="5991078" cy="3650922"/>
+              <a:chOff x="2418493" y="2154342"/>
+              <a:chExt cx="5991078" cy="3650922"/>
+            </a:xfrm>
+          </p:grpSpPr>
+          <p:cxnSp>
+            <p:nvCxnSpPr>
+              <p:cNvPr id="5" name="Straight Arrow Connector 4"/>
+              <p:cNvCxnSpPr/>
+              <p:nvPr/>
+            </p:nvCxnSpPr>
+            <p:spPr bwMode="auto">
+              <a:xfrm>
+                <a:off x="2988459" y="5394702"/>
+                <a:ext cx="5040560" cy="0"/>
+              </a:xfrm>
+              <a:prstGeom prst="straightConnector1">
+                <a:avLst/>
+              </a:prstGeom>
+              <a:solidFill>
+                <a:schemeClr val="accent1"/>
+              </a:solidFill>
+              <a:ln w="19050" cap="flat" cmpd="sng" algn="ctr">
+                <a:solidFill>
+                  <a:srgbClr val="003D62"/>
+                </a:solidFill>
+                <a:prstDash val="solid"/>
+                <a:round/>
+                <a:headEnd type="none" w="med" len="med"/>
+                <a:tailEnd type="triangle" w="lg" len="lg"/>
+              </a:ln>
+              <a:effectLst/>
+              <a:extLst>
+                <a:ext uri="{AF507438-7753-43e0-B8FC-AC1667EBCBE1}">
+                  <a14:hiddenEffects xmlns:a14="http://schemas.microsoft.com/office/drawing/2010/main" xmlns="">
+                    <a:effectLst>
+                      <a:outerShdw blurRad="63500" dist="38099" dir="2700000" algn="ctr" rotWithShape="0">
+                        <a:schemeClr val="bg2">
+                          <a:alpha val="74998"/>
+                        </a:schemeClr>
+                      </a:outerShdw>
+                    </a:effectLst>
+                  </a14:hiddenEffects>
+                </a:ext>
+              </a:extLst>
+            </p:spPr>
+          </p:cxnSp>
+          <p:cxnSp>
+            <p:nvCxnSpPr>
+              <p:cNvPr id="6" name="Straight Arrow Connector 5"/>
+              <p:cNvCxnSpPr/>
+              <p:nvPr/>
+            </p:nvCxnSpPr>
+            <p:spPr bwMode="auto">
+              <a:xfrm flipV="1">
+                <a:off x="2988459" y="2154342"/>
+                <a:ext cx="0" cy="3240360"/>
+              </a:xfrm>
+              <a:prstGeom prst="straightConnector1">
+                <a:avLst/>
+              </a:prstGeom>
+              <a:solidFill>
+                <a:schemeClr val="accent1"/>
+              </a:solidFill>
+              <a:ln w="19050" cap="flat" cmpd="sng" algn="ctr">
+                <a:solidFill>
+                  <a:srgbClr val="003D62"/>
+                </a:solidFill>
+                <a:prstDash val="solid"/>
+                <a:round/>
+                <a:headEnd type="none" w="med" len="med"/>
+                <a:tailEnd type="triangle" w="lg" len="lg"/>
+              </a:ln>
+              <a:effectLst/>
+              <a:extLst>
+                <a:ext uri="{AF507438-7753-43e0-B8FC-AC1667EBCBE1}">
+                  <a14:hiddenEffects xmlns:a14="http://schemas.microsoft.com/office/drawing/2010/main" xmlns="">
+                    <a:effectLst>
+                      <a:outerShdw blurRad="63500" dist="38099" dir="2700000" algn="ctr" rotWithShape="0">
+                        <a:schemeClr val="bg2">
+                          <a:alpha val="74998"/>
+                        </a:schemeClr>
+                      </a:outerShdw>
+                    </a:effectLst>
+                  </a14:hiddenEffects>
+                </a:ext>
+              </a:extLst>
+            </p:spPr>
+          </p:cxnSp>
+          <p:cxnSp>
+            <p:nvCxnSpPr>
+              <p:cNvPr id="11" name="Straight Arrow Connector 10"/>
+              <p:cNvCxnSpPr/>
+              <p:nvPr/>
+            </p:nvCxnSpPr>
+            <p:spPr bwMode="auto">
+              <a:xfrm flipV="1">
+                <a:off x="2988459" y="2874422"/>
+                <a:ext cx="2304256" cy="2520280"/>
+              </a:xfrm>
+              <a:prstGeom prst="straightConnector1">
+                <a:avLst/>
+              </a:prstGeom>
+              <a:solidFill>
+                <a:schemeClr val="accent1"/>
+              </a:solidFill>
+              <a:ln w="19050" cap="flat" cmpd="sng" algn="ctr">
+                <a:solidFill>
+                  <a:srgbClr val="7E002F"/>
+                </a:solidFill>
+                <a:prstDash val="solid"/>
+                <a:round/>
+                <a:headEnd type="none" w="med" len="med"/>
+                <a:tailEnd type="none" w="lg" len="lg"/>
+              </a:ln>
+              <a:effectLst/>
+              <a:extLst>
+                <a:ext uri="{AF507438-7753-43e0-B8FC-AC1667EBCBE1}">
+                  <a14:hiddenEffects xmlns:a14="http://schemas.microsoft.com/office/drawing/2010/main" xmlns="">
+                    <a:effectLst>
+                      <a:outerShdw blurRad="63500" dist="38099" dir="2700000" algn="ctr" rotWithShape="0">
+                        <a:schemeClr val="bg2">
+                          <a:alpha val="74998"/>
+                        </a:schemeClr>
+                      </a:outerShdw>
+                    </a:effectLst>
+                  </a14:hiddenEffects>
+                </a:ext>
+              </a:extLst>
+            </p:spPr>
+          </p:cxnSp>
+          <p:cxnSp>
+            <p:nvCxnSpPr>
+              <p:cNvPr id="12" name="Straight Arrow Connector 11"/>
+              <p:cNvCxnSpPr/>
+              <p:nvPr/>
+            </p:nvCxnSpPr>
+            <p:spPr bwMode="auto">
+              <a:xfrm>
+                <a:off x="5292715" y="2874422"/>
+                <a:ext cx="2664296" cy="0"/>
+              </a:xfrm>
+              <a:prstGeom prst="straightConnector1">
+                <a:avLst/>
+              </a:prstGeom>
+              <a:solidFill>
+                <a:schemeClr val="accent1"/>
+              </a:solidFill>
+              <a:ln w="19050" cap="flat" cmpd="sng" algn="ctr">
+                <a:solidFill>
+                  <a:srgbClr val="7E002F"/>
+                </a:solidFill>
+                <a:prstDash val="solid"/>
+                <a:round/>
+                <a:headEnd type="none" w="med" len="med"/>
+                <a:tailEnd type="none" w="lg" len="lg"/>
+              </a:ln>
+              <a:effectLst/>
+              <a:extLst>
+                <a:ext uri="{AF507438-7753-43e0-B8FC-AC1667EBCBE1}">
+                  <a14:hiddenEffects xmlns:a14="http://schemas.microsoft.com/office/drawing/2010/main" xmlns="">
+                    <a:effectLst>
+                      <a:outerShdw blurRad="63500" dist="38099" dir="2700000" algn="ctr" rotWithShape="0">
+                        <a:schemeClr val="bg2">
+                          <a:alpha val="74998"/>
+                        </a:schemeClr>
+                      </a:outerShdw>
+                    </a:effectLst>
+                  </a14:hiddenEffects>
+                </a:ext>
+              </a:extLst>
+            </p:spPr>
+          </p:cxnSp>
+          <mc:AlternateContent xmlns:mc="http://schemas.openxmlformats.org/markup-compatibility/2006">
+            <mc:Choice xmlns:a14="http://schemas.microsoft.com/office/drawing/2010/main" Requires="a14">
+              <p:sp>
+                <p:nvSpPr>
+                  <p:cNvPr id="16" name="TextBox 15"/>
+                  <p:cNvSpPr txBox="1"/>
+                  <p:nvPr/>
+                </p:nvSpPr>
+                <p:spPr>
+                  <a:xfrm>
+                    <a:off x="4295801" y="5466710"/>
+                    <a:ext cx="2979277" cy="338554"/>
+                  </a:xfrm>
+                  <a:prstGeom prst="rect">
+                    <a:avLst/>
+                  </a:prstGeom>
+                  <a:noFill/>
+                </p:spPr>
+                <p:txBody>
+                  <a:bodyPr wrap="none" rtlCol="0">
+                    <a:spAutoFit/>
+                  </a:bodyPr>
+                  <a:lstStyle/>
+                  <a:p>
+                    <a:r>
+                      <a:rPr lang="en-US" sz="1600" dirty="0">
+                        <a:solidFill>
+                          <a:srgbClr val="003D62"/>
+                        </a:solidFill>
+                        <a:latin typeface="+mj-lt"/>
+                      </a:rPr>
+                      <a:t>Computational intensity (</a:t>
+                    </a:r>
+                    <a14:m>
+                      <m:oMath xmlns:m="http://schemas.openxmlformats.org/officeDocument/2006/math">
+                        <m:sSub>
+                          <m:sSubPr>
+                            <m:ctrlPr>
+                              <a:rPr lang="en-US" sz="1600" i="1" smtClean="0">
+                                <a:solidFill>
+                                  <a:srgbClr val="003D62"/>
+                                </a:solidFill>
+                                <a:latin typeface="Cambria Math" panose="02040503050406030204" pitchFamily="18" charset="0"/>
+                              </a:rPr>
+                            </m:ctrlPr>
+                          </m:sSubPr>
+                          <m:e>
+                            <m:r>
+                              <a:rPr lang="en-US" sz="1600" b="0" i="1" smtClean="0">
+                                <a:solidFill>
+                                  <a:srgbClr val="003D62"/>
+                                </a:solidFill>
+                                <a:latin typeface="Cambria Math" panose="02040503050406030204" pitchFamily="18" charset="0"/>
+                              </a:rPr>
+                              <m:t>𝑖</m:t>
+                            </m:r>
+                          </m:e>
+                          <m:sub>
+                            <m:r>
+                              <a:rPr lang="en-US" sz="1600" b="0" i="1" smtClean="0">
+                                <a:solidFill>
+                                  <a:srgbClr val="003D62"/>
+                                </a:solidFill>
+                                <a:latin typeface="Cambria Math" panose="02040503050406030204" pitchFamily="18" charset="0"/>
+                              </a:rPr>
+                              <m:t>𝑐</m:t>
+                            </m:r>
+                          </m:sub>
+                        </m:sSub>
+                      </m:oMath>
+                    </a14:m>
+                    <a:r>
+                      <a:rPr lang="en-US" sz="1600" dirty="0">
+                        <a:solidFill>
+                          <a:srgbClr val="003D62"/>
+                        </a:solidFill>
+                        <a:latin typeface="+mj-lt"/>
+                      </a:rPr>
+                      <a:t>) [F/B]</a:t>
+                    </a:r>
+                  </a:p>
+                </p:txBody>
+              </p:sp>
+            </mc:Choice>
+            <mc:Fallback>
+              <p:sp>
+                <p:nvSpPr>
+                  <p:cNvPr id="16" name="TextBox 15"/>
+                  <p:cNvSpPr txBox="1">
+                    <a:spLocks noRot="1" noChangeAspect="1" noMove="1" noResize="1" noEditPoints="1" noAdjustHandles="1" noChangeArrowheads="1" noChangeShapeType="1" noTextEdit="1"/>
+                  </p:cNvSpPr>
+                  <p:nvPr/>
+                </p:nvSpPr>
+                <p:spPr>
+                  <a:xfrm>
+                    <a:off x="4295801" y="5466710"/>
+                    <a:ext cx="2979277" cy="338554"/>
+                  </a:xfrm>
+                  <a:prstGeom prst="rect">
+                    <a:avLst/>
+                  </a:prstGeom>
+                  <a:blipFill>
+                    <a:blip r:embed="rId2"/>
+                    <a:stretch>
+                      <a:fillRect l="-1277" t="-3704" b="-22222"/>
+                    </a:stretch>
+                  </a:blipFill>
+                </p:spPr>
+                <p:txBody>
+                  <a:bodyPr/>
+                  <a:lstStyle/>
+                  <a:p>
+                    <a:r>
+                      <a:rPr lang="en-GB">
+                        <a:noFill/>
+                      </a:rPr>
+                      <a:t> </a:t>
+                    </a:r>
+                  </a:p>
+                </p:txBody>
+              </p:sp>
+            </mc:Fallback>
+          </mc:AlternateContent>
+          <p:sp>
+            <p:nvSpPr>
+              <p:cNvPr id="17" name="TextBox 16"/>
+              <p:cNvSpPr txBox="1"/>
+              <p:nvPr/>
+            </p:nvSpPr>
+            <p:spPr>
+              <a:xfrm rot="16200000">
+                <a:off x="1685055" y="3615115"/>
+                <a:ext cx="1836208" cy="369332"/>
+              </a:xfrm>
+              <a:prstGeom prst="rect">
+                <a:avLst/>
+              </a:prstGeom>
+              <a:noFill/>
+            </p:spPr>
+            <p:txBody>
+              <a:bodyPr wrap="none" rtlCol="0">
+                <a:spAutoFit/>
+              </a:bodyPr>
+              <a:lstStyle/>
+              <a:p>
+                <a:r>
+                  <a:rPr lang="en-US" dirty="0">
+                    <a:solidFill>
+                      <a:srgbClr val="003D62"/>
+                    </a:solidFill>
+                    <a:latin typeface="+mj-lt"/>
+                  </a:rPr>
+                  <a:t>Performance [F/s]</a:t>
+                </a:r>
+              </a:p>
+            </p:txBody>
+          </p:sp>
+          <mc:AlternateContent xmlns:mc="http://schemas.openxmlformats.org/markup-compatibility/2006">
+            <mc:Choice xmlns:a14="http://schemas.microsoft.com/office/drawing/2010/main" Requires="a14">
+              <p:sp>
+                <p:nvSpPr>
+                  <p:cNvPr id="20" name="TextBox 19"/>
+                  <p:cNvSpPr txBox="1"/>
+                  <p:nvPr/>
+                </p:nvSpPr>
+                <p:spPr>
+                  <a:xfrm rot="18753246">
+                    <a:off x="3781423" y="3591584"/>
+                    <a:ext cx="571375" cy="338554"/>
+                  </a:xfrm>
+                  <a:prstGeom prst="rect">
+                    <a:avLst/>
+                  </a:prstGeom>
+                  <a:noFill/>
+                </p:spPr>
+                <p:txBody>
+                  <a:bodyPr wrap="none" rtlCol="0">
+                    <a:spAutoFit/>
+                  </a:bodyPr>
+                  <a:lstStyle/>
+                  <a:p>
+                    <a14:m>
+                      <m:oMathPara xmlns:m="http://schemas.openxmlformats.org/officeDocument/2006/math">
+                        <m:oMathParaPr>
+                          <m:jc m:val="centerGroup"/>
+                        </m:oMathParaPr>
+                        <m:oMath xmlns:m="http://schemas.openxmlformats.org/officeDocument/2006/math">
+                          <m:r>
+                            <a:rPr lang="en-US" sz="1600" b="0" i="1" smtClean="0">
+                              <a:solidFill>
+                                <a:srgbClr val="7E002F"/>
+                              </a:solidFill>
+                              <a:latin typeface="Cambria Math" panose="02040503050406030204" pitchFamily="18" charset="0"/>
+                            </a:rPr>
+                            <m:t>𝐵</m:t>
+                          </m:r>
+                          <m:r>
+                            <a:rPr lang="en-US" sz="1600" b="0" i="1" smtClean="0">
+                              <a:solidFill>
+                                <a:srgbClr val="7E002F"/>
+                              </a:solidFill>
+                              <a:latin typeface="Cambria Math" panose="02040503050406030204" pitchFamily="18" charset="0"/>
+                            </a:rPr>
+                            <m:t> </m:t>
+                          </m:r>
+                          <m:sSub>
+                            <m:sSubPr>
+                              <m:ctrlPr>
+                                <a:rPr lang="en-US" sz="1600" b="0" i="1" smtClean="0">
+                                  <a:solidFill>
+                                    <a:srgbClr val="7E002F"/>
+                                  </a:solidFill>
+                                  <a:latin typeface="Cambria Math" panose="02040503050406030204" pitchFamily="18" charset="0"/>
+                                </a:rPr>
+                              </m:ctrlPr>
+                            </m:sSubPr>
+                            <m:e>
+                              <m:r>
+                                <a:rPr lang="en-US" sz="1600" b="0" i="1" smtClean="0">
+                                  <a:solidFill>
+                                    <a:srgbClr val="7E002F"/>
+                                  </a:solidFill>
+                                  <a:latin typeface="Cambria Math" panose="02040503050406030204" pitchFamily="18" charset="0"/>
+                                </a:rPr>
+                                <m:t>𝐼</m:t>
+                              </m:r>
+                            </m:e>
+                            <m:sub>
+                              <m:r>
+                                <a:rPr lang="en-US" sz="1600" b="0" i="1" smtClean="0">
+                                  <a:solidFill>
+                                    <a:srgbClr val="7E002F"/>
+                                  </a:solidFill>
+                                  <a:latin typeface="Cambria Math" panose="02040503050406030204" pitchFamily="18" charset="0"/>
+                                </a:rPr>
+                                <m:t>𝑐</m:t>
+                              </m:r>
+                            </m:sub>
+                          </m:sSub>
+                        </m:oMath>
+                      </m:oMathPara>
+                    </a14:m>
+                    <a:endParaRPr lang="en-US" sz="1600" b="0" dirty="0">
+                      <a:solidFill>
+                        <a:srgbClr val="7E002F"/>
+                      </a:solidFill>
+                    </a:endParaRPr>
+                  </a:p>
+                </p:txBody>
+              </p:sp>
+            </mc:Choice>
+            <mc:Fallback>
+              <p:sp>
+                <p:nvSpPr>
+                  <p:cNvPr id="20" name="TextBox 19"/>
+                  <p:cNvSpPr txBox="1">
+                    <a:spLocks noRot="1" noChangeAspect="1" noMove="1" noResize="1" noEditPoints="1" noAdjustHandles="1" noChangeArrowheads="1" noChangeShapeType="1" noTextEdit="1"/>
+                  </p:cNvSpPr>
+                  <p:nvPr/>
+                </p:nvSpPr>
+                <p:spPr>
+                  <a:xfrm rot="18753246">
+                    <a:off x="3781423" y="3591584"/>
+                    <a:ext cx="571375" cy="338554"/>
+                  </a:xfrm>
+                  <a:prstGeom prst="rect">
+                    <a:avLst/>
+                  </a:prstGeom>
+                  <a:blipFill>
+                    <a:blip r:embed="rId3"/>
+                    <a:stretch>
+                      <a:fillRect/>
+                    </a:stretch>
+                  </a:blipFill>
+                </p:spPr>
+                <p:txBody>
+                  <a:bodyPr/>
+                  <a:lstStyle/>
+                  <a:p>
+                    <a:r>
+                      <a:rPr lang="en-GB">
+                        <a:noFill/>
+                      </a:rPr>
+                      <a:t> </a:t>
+                    </a:r>
+                  </a:p>
+                </p:txBody>
+              </p:sp>
+            </mc:Fallback>
+          </mc:AlternateContent>
+          <p:sp>
+            <p:nvSpPr>
+              <p:cNvPr id="24" name="TextBox 23"/>
+              <p:cNvSpPr txBox="1"/>
+              <p:nvPr/>
+            </p:nvSpPr>
+            <p:spPr>
+              <a:xfrm>
+                <a:off x="3434551" y="2401428"/>
+                <a:ext cx="4378763" cy="338554"/>
+              </a:xfrm>
+              <a:prstGeom prst="rect">
+                <a:avLst/>
+              </a:prstGeom>
+              <a:noFill/>
+            </p:spPr>
+            <p:txBody>
+              <a:bodyPr wrap="none" rtlCol="0">
+                <a:spAutoFit/>
+              </a:bodyPr>
+              <a:lstStyle/>
+              <a:p>
+                <a:r>
+                  <a:rPr lang="en-US" sz="1600" dirty="0">
+                    <a:solidFill>
+                      <a:srgbClr val="003D62"/>
+                    </a:solidFill>
+                    <a:latin typeface="+mj-lt"/>
+                  </a:rPr>
+                  <a:t>Bandwidth limited &lt;-|-&gt; peak performance limited </a:t>
+                </a:r>
+              </a:p>
+            </p:txBody>
+          </p:sp>
+          <p:cxnSp>
+            <p:nvCxnSpPr>
+              <p:cNvPr id="28" name="Straight Arrow Connector 27"/>
+              <p:cNvCxnSpPr/>
+              <p:nvPr/>
+            </p:nvCxnSpPr>
+            <p:spPr bwMode="auto">
+              <a:xfrm>
+                <a:off x="2999656" y="2874422"/>
+                <a:ext cx="2304256" cy="0"/>
+              </a:xfrm>
+              <a:prstGeom prst="straightConnector1">
+                <a:avLst/>
+              </a:prstGeom>
+              <a:solidFill>
+                <a:schemeClr val="accent1"/>
+              </a:solidFill>
+              <a:ln w="19050" cap="flat" cmpd="sng" algn="ctr">
+                <a:solidFill>
+                  <a:srgbClr val="7E002F"/>
+                </a:solidFill>
+                <a:prstDash val="dash"/>
+                <a:round/>
+                <a:headEnd type="none" w="med" len="med"/>
+                <a:tailEnd type="none" w="lg" len="lg"/>
+              </a:ln>
+              <a:effectLst/>
+              <a:extLst>
+                <a:ext uri="{AF507438-7753-43e0-B8FC-AC1667EBCBE1}">
+                  <a14:hiddenEffects xmlns:a14="http://schemas.microsoft.com/office/drawing/2010/main" xmlns="">
+                    <a:effectLst>
+                      <a:outerShdw blurRad="63500" dist="38099" dir="2700000" algn="ctr" rotWithShape="0">
+                        <a:schemeClr val="bg2">
+                          <a:alpha val="74998"/>
+                        </a:schemeClr>
+                      </a:outerShdw>
+                    </a:effectLst>
+                  </a14:hiddenEffects>
+                </a:ext>
+              </a:extLst>
+            </p:spPr>
+          </p:cxnSp>
+          <mc:AlternateContent xmlns:mc="http://schemas.openxmlformats.org/markup-compatibility/2006">
+            <mc:Choice xmlns:a14="http://schemas.microsoft.com/office/drawing/2010/main" Requires="a14">
+              <p:sp>
+                <p:nvSpPr>
+                  <p:cNvPr id="8" name="TextBox 7">
+                    <a:extLst>
+                      <a:ext uri="{FF2B5EF4-FFF2-40B4-BE49-F238E27FC236}">
+                        <a16:creationId xmlns:a16="http://schemas.microsoft.com/office/drawing/2014/main" id="{07953C7D-A754-EB4B-25CE-995993A86598}"/>
+                      </a:ext>
+                    </a:extLst>
+                  </p:cNvPr>
+                  <p:cNvSpPr txBox="1"/>
+                  <p:nvPr/>
+                </p:nvSpPr>
+                <p:spPr>
+                  <a:xfrm>
+                    <a:off x="7957011" y="2679048"/>
+                    <a:ext cx="452560" cy="390748"/>
+                  </a:xfrm>
+                  <a:prstGeom prst="rect">
+                    <a:avLst/>
+                  </a:prstGeom>
+                  <a:noFill/>
+                </p:spPr>
+                <p:txBody>
+                  <a:bodyPr wrap="none" rtlCol="0">
+                    <a:spAutoFit/>
+                  </a:bodyPr>
+                  <a:lstStyle/>
+                  <a:p>
+                    <a14:m>
+                      <m:oMathPara xmlns:m="http://schemas.openxmlformats.org/officeDocument/2006/math">
+                        <m:oMathParaPr>
+                          <m:jc m:val="centerGroup"/>
+                        </m:oMathParaPr>
+                        <m:oMath xmlns:m="http://schemas.openxmlformats.org/officeDocument/2006/math">
+                          <m:sSub>
+                            <m:sSubPr>
+                              <m:ctrlPr>
+                                <a:rPr lang="en-US" b="0" i="1" smtClean="0">
+                                  <a:solidFill>
+                                    <a:srgbClr val="C00000"/>
+                                  </a:solidFill>
+                                  <a:latin typeface="Cambria Math" panose="02040503050406030204" pitchFamily="18" charset="0"/>
+                                </a:rPr>
+                              </m:ctrlPr>
+                            </m:sSubPr>
+                            <m:e>
+                              <m:r>
+                                <a:rPr lang="en-US" b="0" i="1" smtClean="0">
+                                  <a:solidFill>
+                                    <a:srgbClr val="C00000"/>
+                                  </a:solidFill>
+                                  <a:latin typeface="Cambria Math" panose="02040503050406030204" pitchFamily="18" charset="0"/>
+                                </a:rPr>
+                                <m:t>𝑃</m:t>
+                              </m:r>
+                            </m:e>
+                            <m:sub>
+                              <m:r>
+                                <a:rPr lang="en-US" b="0" i="1" smtClean="0">
+                                  <a:solidFill>
+                                    <a:srgbClr val="C00000"/>
+                                  </a:solidFill>
+                                  <a:latin typeface="Cambria Math" panose="02040503050406030204" pitchFamily="18" charset="0"/>
+                                </a:rPr>
+                                <m:t>𝑝</m:t>
+                              </m:r>
+                            </m:sub>
+                          </m:sSub>
+                        </m:oMath>
+                      </m:oMathPara>
+                    </a14:m>
+                    <a:endParaRPr lang="en-GB" dirty="0">
+                      <a:solidFill>
+                        <a:srgbClr val="C00000"/>
+                      </a:solidFill>
+                    </a:endParaRPr>
+                  </a:p>
+                </p:txBody>
+              </p:sp>
+            </mc:Choice>
+            <mc:Fallback>
+              <p:sp>
+                <p:nvSpPr>
+                  <p:cNvPr id="8" name="TextBox 7">
+                    <a:extLst>
+                      <a:ext uri="{FF2B5EF4-FFF2-40B4-BE49-F238E27FC236}">
+                        <a16:creationId xmlns:a16="http://schemas.microsoft.com/office/drawing/2014/main" id="{07953C7D-A754-EB4B-25CE-995993A86598}"/>
+                      </a:ext>
+                    </a:extLst>
+                  </p:cNvPr>
+                  <p:cNvSpPr txBox="1">
+                    <a:spLocks noRot="1" noChangeAspect="1" noMove="1" noResize="1" noEditPoints="1" noAdjustHandles="1" noChangeArrowheads="1" noChangeShapeType="1" noTextEdit="1"/>
+                  </p:cNvSpPr>
+                  <p:nvPr/>
+                </p:nvSpPr>
+                <p:spPr>
+                  <a:xfrm>
+                    <a:off x="7957011" y="2679048"/>
+                    <a:ext cx="452560" cy="390748"/>
+                  </a:xfrm>
+                  <a:prstGeom prst="rect">
+                    <a:avLst/>
+                  </a:prstGeom>
+                  <a:blipFill>
+                    <a:blip r:embed="rId4"/>
+                    <a:stretch>
+                      <a:fillRect b="-3125"/>
+                    </a:stretch>
+                  </a:blipFill>
+                </p:spPr>
+                <p:txBody>
+                  <a:bodyPr/>
+                  <a:lstStyle/>
+                  <a:p>
+                    <a:r>
+                      <a:rPr lang="en-GB">
+                        <a:noFill/>
+                      </a:rPr>
+                      <a:t> </a:t>
+                    </a:r>
+                  </a:p>
+                </p:txBody>
+              </p:sp>
+            </mc:Fallback>
+          </mc:AlternateContent>
+        </p:grpSp>
+        <p:sp>
+          <p:nvSpPr>
+            <p:cNvPr id="10" name="Oval 9">
+              <a:extLst>
+                <a:ext uri="{FF2B5EF4-FFF2-40B4-BE49-F238E27FC236}">
+                  <a16:creationId xmlns:a16="http://schemas.microsoft.com/office/drawing/2014/main" id="{DAD41C12-EF12-1477-DFFB-6E0655069BF2}"/>
+                </a:ext>
+              </a:extLst>
+            </p:cNvPr>
+            <p:cNvSpPr>
+              <a:spLocks noChangeAspect="1"/>
+            </p:cNvSpPr>
+            <p:nvPr/>
+          </p:nvSpPr>
+          <p:spPr>
+            <a:xfrm>
+              <a:off x="4516243" y="4092861"/>
+              <a:ext cx="278777" cy="278777"/>
+            </a:xfrm>
+            <a:prstGeom prst="ellipse">
+              <a:avLst/>
+            </a:prstGeom>
+            <a:ln w="25400">
+              <a:solidFill>
+                <a:srgbClr val="FF0000"/>
+              </a:solidFill>
+            </a:ln>
+          </p:spPr>
+          <p:style>
+            <a:lnRef idx="2">
+              <a:schemeClr val="accent6"/>
+            </a:lnRef>
+            <a:fillRef idx="1">
+              <a:schemeClr val="lt1"/>
+            </a:fillRef>
+            <a:effectRef idx="0">
+              <a:schemeClr val="accent6"/>
+            </a:effectRef>
+            <a:fontRef idx="minor">
+              <a:schemeClr val="dk1"/>
+            </a:fontRef>
+          </p:style>
+          <p:txBody>
+            <a:bodyPr rtlCol="0" anchor="ctr"/>
+            <a:lstStyle/>
+            <a:p>
+              <a:pPr algn="ctr"/>
+              <a:r>
+                <a:rPr lang="en-GB" dirty="0">
+                  <a:solidFill>
+                    <a:srgbClr val="FF0000"/>
+                  </a:solidFill>
+                </a:rPr>
+                <a:t>1</a:t>
+              </a:r>
+            </a:p>
+          </p:txBody>
+        </p:sp>
+        <p:sp>
+          <p:nvSpPr>
+            <p:cNvPr id="13" name="Oval 12">
+              <a:extLst>
+                <a:ext uri="{FF2B5EF4-FFF2-40B4-BE49-F238E27FC236}">
+                  <a16:creationId xmlns:a16="http://schemas.microsoft.com/office/drawing/2014/main" id="{30B79236-7D7B-6FB8-6773-E21336E3D26B}"/>
+                </a:ext>
+              </a:extLst>
+            </p:cNvPr>
+            <p:cNvSpPr>
+              <a:spLocks noChangeAspect="1"/>
+            </p:cNvSpPr>
+            <p:nvPr/>
+          </p:nvSpPr>
+          <p:spPr>
+            <a:xfrm>
+              <a:off x="6408231" y="3788062"/>
+              <a:ext cx="278777" cy="278777"/>
+            </a:xfrm>
+            <a:prstGeom prst="ellipse">
+              <a:avLst/>
+            </a:prstGeom>
+            <a:ln w="25400">
+              <a:solidFill>
+                <a:srgbClr val="FF0000"/>
+              </a:solidFill>
+            </a:ln>
+          </p:spPr>
+          <p:style>
+            <a:lnRef idx="2">
+              <a:schemeClr val="accent6"/>
+            </a:lnRef>
+            <a:fillRef idx="1">
+              <a:schemeClr val="lt1"/>
+            </a:fillRef>
+            <a:effectRef idx="0">
+              <a:schemeClr val="accent6"/>
+            </a:effectRef>
+            <a:fontRef idx="minor">
+              <a:schemeClr val="dk1"/>
+            </a:fontRef>
+          </p:style>
+          <p:txBody>
+            <a:bodyPr rtlCol="0" anchor="ctr"/>
+            <a:lstStyle/>
+            <a:p>
+              <a:pPr algn="ctr"/>
+              <a:r>
+                <a:rPr lang="en-GB" dirty="0">
+                  <a:solidFill>
+                    <a:srgbClr val="FF0000"/>
+                  </a:solidFill>
+                </a:rPr>
+                <a:t>2</a:t>
+              </a:r>
+            </a:p>
+          </p:txBody>
+        </p:sp>
+        <p:sp>
+          <p:nvSpPr>
+            <p:cNvPr id="14" name="Oval 13">
+              <a:extLst>
+                <a:ext uri="{FF2B5EF4-FFF2-40B4-BE49-F238E27FC236}">
+                  <a16:creationId xmlns:a16="http://schemas.microsoft.com/office/drawing/2014/main" id="{A374655F-E771-E798-A03D-72121174FBE9}"/>
+                </a:ext>
+              </a:extLst>
+            </p:cNvPr>
+            <p:cNvSpPr>
+              <a:spLocks noChangeAspect="1"/>
+            </p:cNvSpPr>
+            <p:nvPr/>
+          </p:nvSpPr>
+          <p:spPr>
+            <a:xfrm>
+              <a:off x="5181598" y="2829058"/>
+              <a:ext cx="278777" cy="278777"/>
+            </a:xfrm>
+            <a:prstGeom prst="ellipse">
+              <a:avLst/>
+            </a:prstGeom>
+            <a:ln w="25400">
+              <a:solidFill>
+                <a:srgbClr val="FF0000"/>
+              </a:solidFill>
+            </a:ln>
+          </p:spPr>
+          <p:style>
+            <a:lnRef idx="2">
+              <a:schemeClr val="accent6"/>
+            </a:lnRef>
+            <a:fillRef idx="1">
+              <a:schemeClr val="lt1"/>
+            </a:fillRef>
+            <a:effectRef idx="0">
+              <a:schemeClr val="accent6"/>
+            </a:effectRef>
+            <a:fontRef idx="minor">
+              <a:schemeClr val="dk1"/>
+            </a:fontRef>
+          </p:style>
+          <p:txBody>
+            <a:bodyPr rtlCol="0" anchor="ctr"/>
+            <a:lstStyle/>
+            <a:p>
+              <a:pPr algn="ctr"/>
+              <a:r>
+                <a:rPr lang="en-GB" dirty="0">
+                  <a:solidFill>
+                    <a:srgbClr val="FF0000"/>
+                  </a:solidFill>
+                </a:rPr>
+                <a:t>3</a:t>
+              </a:r>
+            </a:p>
+          </p:txBody>
+        </p:sp>
+        <p:sp>
+          <p:nvSpPr>
+            <p:cNvPr id="15" name="Oval 14">
+              <a:extLst>
+                <a:ext uri="{FF2B5EF4-FFF2-40B4-BE49-F238E27FC236}">
+                  <a16:creationId xmlns:a16="http://schemas.microsoft.com/office/drawing/2014/main" id="{F9A391E0-402A-607E-0473-EA3DE1ADE0C5}"/>
+                </a:ext>
+              </a:extLst>
+            </p:cNvPr>
+            <p:cNvSpPr>
+              <a:spLocks noChangeAspect="1"/>
+            </p:cNvSpPr>
+            <p:nvPr/>
+          </p:nvSpPr>
+          <p:spPr>
+            <a:xfrm>
+              <a:off x="7199965" y="2829056"/>
+              <a:ext cx="278777" cy="278777"/>
+            </a:xfrm>
+            <a:prstGeom prst="ellipse">
+              <a:avLst/>
+            </a:prstGeom>
+            <a:ln w="25400">
+              <a:solidFill>
+                <a:srgbClr val="FF0000"/>
+              </a:solidFill>
+            </a:ln>
+          </p:spPr>
+          <p:style>
+            <a:lnRef idx="2">
+              <a:schemeClr val="accent6"/>
+            </a:lnRef>
+            <a:fillRef idx="1">
+              <a:schemeClr val="lt1"/>
+            </a:fillRef>
+            <a:effectRef idx="0">
+              <a:schemeClr val="accent6"/>
+            </a:effectRef>
+            <a:fontRef idx="minor">
+              <a:schemeClr val="dk1"/>
+            </a:fontRef>
+          </p:style>
+          <p:txBody>
+            <a:bodyPr rtlCol="0" anchor="ctr"/>
+            <a:lstStyle/>
+            <a:p>
+              <a:pPr algn="ctr"/>
+              <a:r>
+                <a:rPr lang="en-GB" dirty="0">
+                  <a:solidFill>
+                    <a:srgbClr val="FF0000"/>
+                  </a:solidFill>
+                </a:rPr>
+                <a:t>4</a:t>
+              </a:r>
+            </a:p>
+          </p:txBody>
+        </p:sp>
+      </p:grpSp>
+    </p:spTree>
+    <p:extLst>
+      <p:ext uri="{BB962C8B-B14F-4D97-AF65-F5344CB8AC3E}">
+        <p14:creationId xmlns:p14="http://schemas.microsoft.com/office/powerpoint/2010/main" val="2209610087"/>
+      </p:ext>
+    </p:extLst>
+  </p:cSld>
+  <p:clrMapOvr>
+    <a:masterClrMapping/>
+  </p:clrMapOvr>
+</p:sld>
+</file>
+
 <file path=ppt/theme/theme1.xml><?xml version="1.0" encoding="utf-8"?>
 <a:theme xmlns:a="http://schemas.openxmlformats.org/drawingml/2006/main" name="Office Theme">
   <a:themeElements>

</xml_diff>